<commit_message>
Auto-updater Bot Study material Allianz_SAC_Training
</commit_message>
<xml_diff>
--- a/day 10/SAC_Training Day 10.pptx
+++ b/day 10/SAC_Training Day 10.pptx
@@ -1218,7 +1218,7 @@
           <a:p>
             <a:fld id="{4AF2A06D-4991-4208-8C88-4E8BAD69A8B8}" type="datetimeFigureOut">
               <a:rPr lang="en-US" smtClean="0"/>
-              <a:t>6/2/2023</a:t>
+              <a:t>6/5/2023</a:t>
             </a:fld>
             <a:endParaRPr lang="en-US"/>
           </a:p>
@@ -1842,7 +1842,7 @@
           <a:p>
             <a:fld id="{E26E0DA5-0C76-4851-AA82-0B75261F9EB4}" type="datetimeFigureOut">
               <a:rPr lang="en-US" smtClean="0"/>
-              <a:t>6/2/2023</a:t>
+              <a:t>6/5/2023</a:t>
             </a:fld>
             <a:endParaRPr lang="en-US"/>
           </a:p>
@@ -2010,7 +2010,7 @@
           <a:p>
             <a:fld id="{E26E0DA5-0C76-4851-AA82-0B75261F9EB4}" type="datetimeFigureOut">
               <a:rPr lang="en-US" smtClean="0"/>
-              <a:t>6/2/2023</a:t>
+              <a:t>6/5/2023</a:t>
             </a:fld>
             <a:endParaRPr lang="en-US"/>
           </a:p>
@@ -2188,7 +2188,7 @@
           <a:p>
             <a:fld id="{E26E0DA5-0C76-4851-AA82-0B75261F9EB4}" type="datetimeFigureOut">
               <a:rPr lang="en-US" smtClean="0"/>
-              <a:t>6/2/2023</a:t>
+              <a:t>6/5/2023</a:t>
             </a:fld>
             <a:endParaRPr lang="en-US"/>
           </a:p>
@@ -2515,7 +2515,7 @@
             <a:fld id="{9578D6DB-6798-42D2-B9AD-FC6F1C72FC30}" type="datetimeFigureOut">
               <a:rPr lang="en-US" smtClean="0"/>
               <a:pPr/>
-              <a:t>6/2/2023</a:t>
+              <a:t>6/5/2023</a:t>
             </a:fld>
             <a:endParaRPr lang="en-US"/>
           </a:p>
@@ -2757,7 +2757,7 @@
             <a:fld id="{425404F2-BE9A-4460-8815-8F645183555F}" type="datetimeFigureOut">
               <a:rPr lang="en-US" smtClean="0"/>
               <a:pPr/>
-              <a:t>6/2/2023</a:t>
+              <a:t>6/5/2023</a:t>
             </a:fld>
             <a:endParaRPr lang="en-US"/>
           </a:p>
@@ -2885,7 +2885,7 @@
             <a:fld id="{425404F2-BE9A-4460-8815-8F645183555F}" type="datetimeFigureOut">
               <a:rPr lang="en-US" smtClean="0"/>
               <a:pPr/>
-              <a:t>6/2/2023</a:t>
+              <a:t>6/5/2023</a:t>
             </a:fld>
             <a:endParaRPr lang="en-US"/>
           </a:p>
@@ -3135,7 +3135,7 @@
             <a:fld id="{425404F2-BE9A-4460-8815-8F645183555F}" type="datetimeFigureOut">
               <a:rPr lang="en-US" smtClean="0"/>
               <a:pPr/>
-              <a:t>6/2/2023</a:t>
+              <a:t>6/5/2023</a:t>
             </a:fld>
             <a:endParaRPr lang="en-US"/>
           </a:p>
@@ -3305,7 +3305,7 @@
             <a:fld id="{425404F2-BE9A-4460-8815-8F645183555F}" type="datetimeFigureOut">
               <a:rPr lang="en-US" smtClean="0"/>
               <a:pPr/>
-              <a:t>6/2/2023</a:t>
+              <a:t>6/5/2023</a:t>
             </a:fld>
             <a:endParaRPr lang="en-US"/>
           </a:p>
@@ -3592,7 +3592,7 @@
             <a:fld id="{425404F2-BE9A-4460-8815-8F645183555F}" type="datetimeFigureOut">
               <a:rPr lang="en-US" smtClean="0"/>
               <a:pPr/>
-              <a:t>6/2/2023</a:t>
+              <a:t>6/5/2023</a:t>
             </a:fld>
             <a:endParaRPr lang="en-US"/>
           </a:p>
@@ -4013,7 +4013,7 @@
             <a:fld id="{425404F2-BE9A-4460-8815-8F645183555F}" type="datetimeFigureOut">
               <a:rPr lang="en-US" smtClean="0"/>
               <a:pPr/>
-              <a:t>6/2/2023</a:t>
+              <a:t>6/5/2023</a:t>
             </a:fld>
             <a:endParaRPr lang="en-US"/>
           </a:p>
@@ -4138,7 +4138,7 @@
             <a:fld id="{425404F2-BE9A-4460-8815-8F645183555F}" type="datetimeFigureOut">
               <a:rPr lang="en-US" smtClean="0"/>
               <a:pPr/>
-              <a:t>6/2/2023</a:t>
+              <a:t>6/5/2023</a:t>
             </a:fld>
             <a:endParaRPr lang="en-US"/>
           </a:p>
@@ -4364,7 +4364,7 @@
           <a:p>
             <a:fld id="{E26E0DA5-0C76-4851-AA82-0B75261F9EB4}" type="datetimeFigureOut">
               <a:rPr lang="en-US" smtClean="0"/>
-              <a:t>6/2/2023</a:t>
+              <a:t>6/5/2023</a:t>
             </a:fld>
             <a:endParaRPr lang="en-US"/>
           </a:p>
@@ -4488,7 +4488,7 @@
             <a:fld id="{425404F2-BE9A-4460-8815-8F645183555F}" type="datetimeFigureOut">
               <a:rPr lang="en-US" smtClean="0"/>
               <a:pPr/>
-              <a:t>6/2/2023</a:t>
+              <a:t>6/5/2023</a:t>
             </a:fld>
             <a:endParaRPr lang="en-US"/>
           </a:p>
@@ -5035,7 +5035,7 @@
             <a:fld id="{425404F2-BE9A-4460-8815-8F645183555F}" type="datetimeFigureOut">
               <a:rPr lang="en-US" smtClean="0"/>
               <a:pPr/>
-              <a:t>6/2/2023</a:t>
+              <a:t>6/5/2023</a:t>
             </a:fld>
             <a:endParaRPr lang="en-US"/>
           </a:p>
@@ -5183,7 +5183,7 @@
             <a:fld id="{425404F2-BE9A-4460-8815-8F645183555F}" type="datetimeFigureOut">
               <a:rPr lang="en-US" smtClean="0"/>
               <a:pPr/>
-              <a:t>6/2/2023</a:t>
+              <a:t>6/5/2023</a:t>
             </a:fld>
             <a:endParaRPr lang="en-US"/>
           </a:p>
@@ -5416,7 +5416,7 @@
             <a:fld id="{425404F2-BE9A-4460-8815-8F645183555F}" type="datetimeFigureOut">
               <a:rPr lang="en-US" smtClean="0"/>
               <a:pPr/>
-              <a:t>6/2/2023</a:t>
+              <a:t>6/5/2023</a:t>
             </a:fld>
             <a:endParaRPr lang="en-US"/>
           </a:p>
@@ -5654,7 +5654,7 @@
             <a:fld id="{425404F2-BE9A-4460-8815-8F645183555F}" type="datetimeFigureOut">
               <a:rPr lang="en-US" smtClean="0"/>
               <a:pPr/>
-              <a:t>6/2/2023</a:t>
+              <a:t>6/5/2023</a:t>
             </a:fld>
             <a:endParaRPr lang="en-US"/>
           </a:p>
@@ -5836,7 +5836,7 @@
             <a:fld id="{425404F2-BE9A-4460-8815-8F645183555F}" type="datetimeFigureOut">
               <a:rPr lang="en-US" smtClean="0"/>
               <a:pPr/>
-              <a:t>6/2/2023</a:t>
+              <a:t>6/5/2023</a:t>
             </a:fld>
             <a:endParaRPr lang="en-US"/>
           </a:p>
@@ -6113,7 +6113,7 @@
             <a:fld id="{425404F2-BE9A-4460-8815-8F645183555F}" type="datetimeFigureOut">
               <a:rPr lang="en-US" smtClean="0"/>
               <a:pPr/>
-              <a:t>6/2/2023</a:t>
+              <a:t>6/5/2023</a:t>
             </a:fld>
             <a:endParaRPr lang="en-US"/>
           </a:p>
@@ -6367,7 +6367,7 @@
             <a:fld id="{425404F2-BE9A-4460-8815-8F645183555F}" type="datetimeFigureOut">
               <a:rPr lang="en-US" smtClean="0"/>
               <a:pPr/>
-              <a:t>6/2/2023</a:t>
+              <a:t>6/5/2023</a:t>
             </a:fld>
             <a:endParaRPr lang="en-US"/>
           </a:p>
@@ -6537,7 +6537,7 @@
             <a:fld id="{425404F2-BE9A-4460-8815-8F645183555F}" type="datetimeFigureOut">
               <a:rPr lang="en-US" smtClean="0"/>
               <a:pPr/>
-              <a:t>6/2/2023</a:t>
+              <a:t>6/5/2023</a:t>
             </a:fld>
             <a:endParaRPr lang="en-US"/>
           </a:p>
@@ -6717,7 +6717,7 @@
             <a:fld id="{425404F2-BE9A-4460-8815-8F645183555F}" type="datetimeFigureOut">
               <a:rPr lang="en-US" smtClean="0"/>
               <a:pPr/>
-              <a:t>6/2/2023</a:t>
+              <a:t>6/5/2023</a:t>
             </a:fld>
             <a:endParaRPr lang="en-US"/>
           </a:p>
@@ -6963,7 +6963,7 @@
           <a:p>
             <a:fld id="{E26E0DA5-0C76-4851-AA82-0B75261F9EB4}" type="datetimeFigureOut">
               <a:rPr lang="en-US" smtClean="0"/>
-              <a:t>6/2/2023</a:t>
+              <a:t>6/5/2023</a:t>
             </a:fld>
             <a:endParaRPr lang="en-US"/>
           </a:p>
@@ -7192,7 +7192,7 @@
           <a:p>
             <a:fld id="{E26E0DA5-0C76-4851-AA82-0B75261F9EB4}" type="datetimeFigureOut">
               <a:rPr lang="en-US" smtClean="0"/>
-              <a:t>6/2/2023</a:t>
+              <a:t>6/5/2023</a:t>
             </a:fld>
             <a:endParaRPr lang="en-US"/>
           </a:p>
@@ -7556,7 +7556,7 @@
           <a:p>
             <a:fld id="{E26E0DA5-0C76-4851-AA82-0B75261F9EB4}" type="datetimeFigureOut">
               <a:rPr lang="en-US" smtClean="0"/>
-              <a:t>6/2/2023</a:t>
+              <a:t>6/5/2023</a:t>
             </a:fld>
             <a:endParaRPr lang="en-US"/>
           </a:p>
@@ -7673,7 +7673,7 @@
           <a:p>
             <a:fld id="{E26E0DA5-0C76-4851-AA82-0B75261F9EB4}" type="datetimeFigureOut">
               <a:rPr lang="en-US" smtClean="0"/>
-              <a:t>6/2/2023</a:t>
+              <a:t>6/5/2023</a:t>
             </a:fld>
             <a:endParaRPr lang="en-US"/>
           </a:p>
@@ -7768,7 +7768,7 @@
           <a:p>
             <a:fld id="{E26E0DA5-0C76-4851-AA82-0B75261F9EB4}" type="datetimeFigureOut">
               <a:rPr lang="en-US" smtClean="0"/>
-              <a:t>6/2/2023</a:t>
+              <a:t>6/5/2023</a:t>
             </a:fld>
             <a:endParaRPr lang="en-US"/>
           </a:p>
@@ -8043,7 +8043,7 @@
           <a:p>
             <a:fld id="{E26E0DA5-0C76-4851-AA82-0B75261F9EB4}" type="datetimeFigureOut">
               <a:rPr lang="en-US" smtClean="0"/>
-              <a:t>6/2/2023</a:t>
+              <a:t>6/5/2023</a:t>
             </a:fld>
             <a:endParaRPr lang="en-US"/>
           </a:p>
@@ -8295,7 +8295,7 @@
           <a:p>
             <a:fld id="{E26E0DA5-0C76-4851-AA82-0B75261F9EB4}" type="datetimeFigureOut">
               <a:rPr lang="en-US" smtClean="0"/>
-              <a:t>6/2/2023</a:t>
+              <a:t>6/5/2023</a:t>
             </a:fld>
             <a:endParaRPr lang="en-US"/>
           </a:p>
@@ -8506,7 +8506,7 @@
           <a:p>
             <a:fld id="{E26E0DA5-0C76-4851-AA82-0B75261F9EB4}" type="datetimeFigureOut">
               <a:rPr lang="en-US" smtClean="0"/>
-              <a:t>6/2/2023</a:t>
+              <a:t>6/5/2023</a:t>
             </a:fld>
             <a:endParaRPr lang="en-US"/>
           </a:p>
@@ -9063,7 +9063,7 @@
             <a:fld id="{425404F2-BE9A-4460-8815-8F645183555F}" type="datetimeFigureOut">
               <a:rPr lang="en-US" smtClean="0"/>
               <a:pPr/>
-              <a:t>6/2/2023</a:t>
+              <a:t>6/5/2023</a:t>
             </a:fld>
             <a:endParaRPr lang="en-US"/>
           </a:p>

</xml_diff>